<commit_message>
small addition to CT slides
</commit_message>
<xml_diff>
--- a/slides/CT.pptx
+++ b/slides/CT.pptx
@@ -5,7 +5,7 @@
     <p:sldMasterId id="2147483648" r:id="rId1"/>
   </p:sldMasterIdLst>
   <p:notesMasterIdLst>
-    <p:notesMasterId r:id="rId16"/>
+    <p:notesMasterId r:id="rId17"/>
   </p:notesMasterIdLst>
   <p:sldIdLst>
     <p:sldId id="256" r:id="rId2"/>
@@ -22,6 +22,7 @@
     <p:sldId id="272" r:id="rId13"/>
     <p:sldId id="275" r:id="rId14"/>
     <p:sldId id="261" r:id="rId15"/>
+    <p:sldId id="276" r:id="rId16"/>
   </p:sldIdLst>
   <p:sldSz cx="12192000" cy="6858000"/>
   <p:notesSz cx="6858000" cy="9144000"/>
@@ -4025,8 +4026,8 @@
         </p:nvSpPr>
         <p:spPr>
           <a:xfrm>
-            <a:off x="557666" y="3447296"/>
-            <a:ext cx="3131618" cy="1107996"/>
+            <a:off x="363017" y="2716182"/>
+            <a:ext cx="3520915" cy="1938992"/>
           </a:xfrm>
           <a:prstGeom prst="rect">
             <a:avLst/>
@@ -4040,47 +4041,77 @@
           <a:lstStyle/>
           <a:p>
             <a:r>
-              <a:rPr lang="de-DE" sz="2200" dirty="0"/>
-              <a:t>band-limited </a:t>
-            </a:r>
-            <a:r>
-              <a:rPr lang="de-DE" sz="2200" dirty="0" err="1"/>
+              <a:rPr lang="de-DE" sz="2400" dirty="0" err="1"/>
+              <a:t>need</a:t>
+            </a:r>
+            <a:r>
+              <a:rPr lang="de-DE" sz="2400" dirty="0"/>
+              <a:t> </a:t>
+            </a:r>
+            <a:r>
+              <a:rPr lang="de-DE" sz="2400" dirty="0" err="1"/>
+              <a:t>for</a:t>
+            </a:r>
+            <a:r>
+              <a:rPr lang="de-DE" sz="2400" dirty="0"/>
+              <a:t> </a:t>
+            </a:r>
+            <a:r>
+              <a:rPr lang="de-DE" sz="2400" b="1" dirty="0"/>
+              <a:t>high-pass </a:t>
+            </a:r>
+            <a:r>
+              <a:rPr lang="de-DE" sz="2400" b="1" dirty="0" err="1"/>
+              <a:t>filter</a:t>
+            </a:r>
+            <a:endParaRPr lang="de-DE" sz="2400" b="1" dirty="0"/>
+          </a:p>
+          <a:p>
+            <a:endParaRPr lang="de-DE" sz="2400" dirty="0"/>
+          </a:p>
+          <a:p>
+            <a:r>
+              <a:rPr lang="de-DE" sz="2400" dirty="0"/>
+              <a:t>e.g., band-limited </a:t>
+            </a:r>
+            <a:r>
+              <a:rPr lang="de-DE" sz="2400" dirty="0" err="1"/>
               <a:t>ramp</a:t>
             </a:r>
             <a:r>
-              <a:rPr lang="de-DE" sz="2200" dirty="0"/>
+              <a:rPr lang="de-DE" sz="2400" dirty="0"/>
               <a:t> </a:t>
             </a:r>
             <a:r>
-              <a:rPr lang="de-DE" sz="2200" dirty="0" err="1"/>
+              <a:rPr lang="de-DE" sz="2400" dirty="0" err="1"/>
               <a:t>filter</a:t>
             </a:r>
             <a:r>
-              <a:rPr lang="de-DE" sz="2200" dirty="0"/>
+              <a:rPr lang="de-DE" sz="2400" dirty="0"/>
               <a:t> </a:t>
             </a:r>
             <a:r>
-              <a:rPr lang="de-DE" sz="2200" dirty="0" err="1"/>
+              <a:rPr lang="de-DE" sz="2400" dirty="0" err="1"/>
               <a:t>using</a:t>
             </a:r>
             <a:r>
-              <a:rPr lang="de-DE" sz="2200" dirty="0"/>
+              <a:rPr lang="de-DE" sz="2400" dirty="0"/>
               <a:t> a Hamming </a:t>
             </a:r>
             <a:r>
-              <a:rPr lang="de-DE" sz="2200" dirty="0" err="1"/>
+              <a:rPr lang="de-DE" sz="2400" dirty="0" err="1"/>
               <a:t>windowing</a:t>
             </a:r>
             <a:r>
-              <a:rPr lang="de-DE" sz="2200" dirty="0"/>
+              <a:rPr lang="de-DE" sz="2400" dirty="0"/>
               <a:t> </a:t>
             </a:r>
             <a:r>
-              <a:rPr lang="de-DE" sz="2200" dirty="0" err="1"/>
+              <a:rPr lang="de-DE" sz="2400" dirty="0" err="1"/>
               <a:t>function</a:t>
             </a:r>
             <a:r>
-              <a:rPr lang="de-DE" sz="2200" dirty="0"/>
+              <a:rPr lang="de-DE" sz="2400" dirty="0"/>
               <a:t>:</a:t>
             </a:r>
           </a:p>
@@ -5516,6 +5547,340 @@
     <p:extLst>
       <p:ext uri="{BB962C8B-B14F-4D97-AF65-F5344CB8AC3E}">
         <p14:creationId xmlns:p14="http://schemas.microsoft.com/office/powerpoint/2010/main" val="3766084937"/>
+      </p:ext>
+    </p:extLst>
+  </p:cSld>
+  <p:clrMapOvr>
+    <a:masterClrMapping/>
+  </p:clrMapOvr>
+</p:sld>
+</file>
+
+<file path=ppt/slides/slide15.xml><?xml version="1.0" encoding="utf-8"?>
+<p:sld xmlns:a="http://schemas.openxmlformats.org/drawingml/2006/main" xmlns:r="http://schemas.openxmlformats.org/officeDocument/2006/relationships" xmlns:p="http://schemas.openxmlformats.org/presentationml/2006/main">
+  <p:cSld>
+    <p:spTree>
+      <p:nvGrpSpPr>
+        <p:cNvPr id="1" name=""/>
+        <p:cNvGrpSpPr/>
+        <p:nvPr/>
+      </p:nvGrpSpPr>
+      <p:grpSpPr>
+        <a:xfrm>
+          <a:off x="0" y="0"/>
+          <a:ext cx="0" cy="0"/>
+          <a:chOff x="0" y="0"/>
+          <a:chExt cx="0" cy="0"/>
+        </a:xfrm>
+      </p:grpSpPr>
+      <p:sp>
+        <p:nvSpPr>
+          <p:cNvPr id="2" name="Titel 1">
+            <a:extLst>
+              <a:ext uri="{FF2B5EF4-FFF2-40B4-BE49-F238E27FC236}">
+                <a16:creationId xmlns:a16="http://schemas.microsoft.com/office/drawing/2014/main" id="{58397DD3-D16E-BF02-20B3-81277454C088}"/>
+              </a:ext>
+            </a:extLst>
+          </p:cNvPr>
+          <p:cNvSpPr>
+            <a:spLocks noGrp="1"/>
+          </p:cNvSpPr>
+          <p:nvPr>
+            <p:ph type="title"/>
+          </p:nvPr>
+        </p:nvSpPr>
+        <p:spPr/>
+        <p:txBody>
+          <a:bodyPr/>
+          <a:lstStyle/>
+          <a:p>
+            <a:r>
+              <a:rPr lang="de-DE" dirty="0"/>
+              <a:t>Other Deep Learning </a:t>
+            </a:r>
+            <a:r>
+              <a:rPr lang="de-DE" dirty="0" err="1"/>
+              <a:t>Applications</a:t>
+            </a:r>
+            <a:endParaRPr lang="de-DE" dirty="0"/>
+          </a:p>
+        </p:txBody>
+      </p:sp>
+      <p:sp>
+        <p:nvSpPr>
+          <p:cNvPr id="3" name="Inhaltsplatzhalter 2">
+            <a:extLst>
+              <a:ext uri="{FF2B5EF4-FFF2-40B4-BE49-F238E27FC236}">
+                <a16:creationId xmlns:a16="http://schemas.microsoft.com/office/drawing/2014/main" id="{06CBB0FE-DFDC-B5FC-6BA8-EEB7CDB50088}"/>
+              </a:ext>
+            </a:extLst>
+          </p:cNvPr>
+          <p:cNvSpPr>
+            <a:spLocks noGrp="1"/>
+          </p:cNvSpPr>
+          <p:nvPr>
+            <p:ph idx="1"/>
+          </p:nvPr>
+        </p:nvSpPr>
+        <p:spPr/>
+        <p:txBody>
+          <a:bodyPr/>
+          <a:lstStyle/>
+          <a:p>
+            <a:pPr marL="0" indent="0">
+              <a:buNone/>
+            </a:pPr>
+            <a:r>
+              <a:rPr lang="de-DE" dirty="0" err="1"/>
+              <a:t>besides</a:t>
+            </a:r>
+            <a:r>
+              <a:rPr lang="de-DE" dirty="0"/>
+              <a:t> </a:t>
+            </a:r>
+            <a:r>
+              <a:rPr lang="de-DE" dirty="0" err="1"/>
+              <a:t>reconstruction</a:t>
+            </a:r>
+            <a:r>
+              <a:rPr lang="de-DE" dirty="0"/>
+              <a:t>, </a:t>
+            </a:r>
+            <a:r>
+              <a:rPr lang="de-DE" dirty="0" err="1"/>
+              <a:t>deep</a:t>
+            </a:r>
+            <a:r>
+              <a:rPr lang="de-DE" dirty="0"/>
+              <a:t> </a:t>
+            </a:r>
+            <a:r>
+              <a:rPr lang="de-DE" dirty="0" err="1"/>
+              <a:t>learning</a:t>
+            </a:r>
+            <a:r>
+              <a:rPr lang="de-DE" dirty="0"/>
+              <a:t> </a:t>
+            </a:r>
+            <a:r>
+              <a:rPr lang="de-DE" dirty="0" err="1"/>
+              <a:t>can</a:t>
+            </a:r>
+            <a:r>
+              <a:rPr lang="de-DE" dirty="0"/>
+              <a:t> also </a:t>
+            </a:r>
+            <a:r>
+              <a:rPr lang="de-DE" dirty="0" err="1"/>
+              <a:t>be</a:t>
+            </a:r>
+            <a:r>
+              <a:rPr lang="de-DE" dirty="0"/>
+              <a:t> </a:t>
+            </a:r>
+            <a:r>
+              <a:rPr lang="de-DE" dirty="0" err="1"/>
+              <a:t>used</a:t>
+            </a:r>
+            <a:r>
+              <a:rPr lang="de-DE" dirty="0"/>
+              <a:t> </a:t>
+            </a:r>
+            <a:r>
+              <a:rPr lang="de-DE" dirty="0" err="1"/>
+              <a:t>for</a:t>
+            </a:r>
+            <a:r>
+              <a:rPr lang="de-DE" dirty="0"/>
+              <a:t>:</a:t>
+            </a:r>
+          </a:p>
+          <a:p>
+            <a:r>
+              <a:rPr lang="de-DE" dirty="0" err="1"/>
+              <a:t>classification</a:t>
+            </a:r>
+            <a:r>
+              <a:rPr lang="de-DE" dirty="0"/>
+              <a:t> and </a:t>
+            </a:r>
+            <a:r>
+              <a:rPr lang="de-DE" dirty="0" err="1"/>
+              <a:t>detection</a:t>
+            </a:r>
+            <a:r>
+              <a:rPr lang="de-DE" dirty="0"/>
+              <a:t> (e.g., </a:t>
+            </a:r>
+            <a:r>
+              <a:rPr lang="de-DE" dirty="0" err="1"/>
+              <a:t>tumors</a:t>
+            </a:r>
+            <a:r>
+              <a:rPr lang="de-DE" dirty="0"/>
+              <a:t>)</a:t>
+            </a:r>
+          </a:p>
+          <a:p>
+            <a:r>
+              <a:rPr lang="de-DE" dirty="0" err="1"/>
+              <a:t>semantic</a:t>
+            </a:r>
+            <a:r>
+              <a:rPr lang="de-DE" dirty="0"/>
+              <a:t> </a:t>
+            </a:r>
+            <a:r>
+              <a:rPr lang="de-DE" dirty="0" err="1"/>
+              <a:t>segmentation</a:t>
+            </a:r>
+            <a:r>
+              <a:rPr lang="de-DE" dirty="0"/>
+              <a:t> (e.g., </a:t>
+            </a:r>
+            <a:r>
+              <a:rPr lang="de-DE" dirty="0" err="1"/>
+              <a:t>organs</a:t>
+            </a:r>
+            <a:r>
+              <a:rPr lang="de-DE" dirty="0"/>
+              <a:t>)</a:t>
+            </a:r>
+          </a:p>
+          <a:p>
+            <a:r>
+              <a:rPr lang="de-DE" dirty="0" err="1"/>
+              <a:t>noise</a:t>
+            </a:r>
+            <a:r>
+              <a:rPr lang="de-DE" dirty="0"/>
+              <a:t> </a:t>
+            </a:r>
+            <a:r>
+              <a:rPr lang="de-DE" dirty="0" err="1"/>
+              <a:t>reduction</a:t>
+            </a:r>
+            <a:r>
+              <a:rPr lang="de-DE" dirty="0"/>
+              <a:t> and </a:t>
+            </a:r>
+            <a:r>
+              <a:rPr lang="de-DE" dirty="0" err="1"/>
+              <a:t>image</a:t>
+            </a:r>
+            <a:r>
+              <a:rPr lang="de-DE" dirty="0"/>
+              <a:t> </a:t>
+            </a:r>
+            <a:r>
+              <a:rPr lang="de-DE" dirty="0" err="1"/>
+              <a:t>enhancement</a:t>
+            </a:r>
+            <a:endParaRPr lang="de-DE" dirty="0"/>
+          </a:p>
+          <a:p>
+            <a:r>
+              <a:rPr lang="de-DE" dirty="0" err="1"/>
+              <a:t>image</a:t>
+            </a:r>
+            <a:r>
+              <a:rPr lang="de-DE" dirty="0"/>
+              <a:t> </a:t>
+            </a:r>
+            <a:r>
+              <a:rPr lang="de-DE" dirty="0" err="1"/>
+              <a:t>registration</a:t>
+            </a:r>
+            <a:r>
+              <a:rPr lang="de-DE" dirty="0"/>
+              <a:t> and </a:t>
+            </a:r>
+            <a:r>
+              <a:rPr lang="de-DE" dirty="0" err="1"/>
+              <a:t>fusion</a:t>
+            </a:r>
+            <a:r>
+              <a:rPr lang="de-DE" dirty="0"/>
+              <a:t> </a:t>
+            </a:r>
+            <a:r>
+              <a:rPr lang="de-DE" dirty="0" err="1"/>
+              <a:t>across</a:t>
+            </a:r>
+            <a:r>
+              <a:rPr lang="de-DE" dirty="0"/>
+              <a:t> </a:t>
+            </a:r>
+            <a:r>
+              <a:rPr lang="de-DE" dirty="0" err="1"/>
+              <a:t>modalities</a:t>
+            </a:r>
+            <a:r>
+              <a:rPr lang="de-DE" dirty="0"/>
+              <a:t> (e.g., CT and MRI)</a:t>
+            </a:r>
+          </a:p>
+          <a:p>
+            <a:r>
+              <a:rPr lang="de-DE" dirty="0"/>
+              <a:t>quantitative </a:t>
+            </a:r>
+            <a:r>
+              <a:rPr lang="de-DE" dirty="0" err="1"/>
+              <a:t>analysis</a:t>
+            </a:r>
+            <a:endParaRPr lang="de-DE" dirty="0"/>
+          </a:p>
+          <a:p>
+            <a:r>
+              <a:rPr lang="de-DE" dirty="0" err="1"/>
+              <a:t>anomaly</a:t>
+            </a:r>
+            <a:r>
+              <a:rPr lang="de-DE" dirty="0"/>
+              <a:t> </a:t>
+            </a:r>
+            <a:r>
+              <a:rPr lang="de-DE" dirty="0" err="1"/>
+              <a:t>detection</a:t>
+            </a:r>
+            <a:endParaRPr lang="de-DE" dirty="0"/>
+          </a:p>
+        </p:txBody>
+      </p:sp>
+      <p:sp>
+        <p:nvSpPr>
+          <p:cNvPr id="4" name="Foliennummernplatzhalter 3">
+            <a:extLst>
+              <a:ext uri="{FF2B5EF4-FFF2-40B4-BE49-F238E27FC236}">
+                <a16:creationId xmlns:a16="http://schemas.microsoft.com/office/drawing/2014/main" id="{F8E19650-0786-61BE-7053-7BDA4D45DEB1}"/>
+              </a:ext>
+            </a:extLst>
+          </p:cNvPr>
+          <p:cNvSpPr>
+            <a:spLocks noGrp="1"/>
+          </p:cNvSpPr>
+          <p:nvPr>
+            <p:ph type="sldNum" sz="quarter" idx="12"/>
+          </p:nvPr>
+        </p:nvSpPr>
+        <p:spPr/>
+        <p:txBody>
+          <a:bodyPr/>
+          <a:lstStyle/>
+          <a:p>
+            <a:fld id="{FD50B010-3F09-4BF2-AC9E-0082EFF861BF}" type="slidenum">
+              <a:rPr lang="en-GB" smtClean="0"/>
+              <a:t>15</a:t>
+            </a:fld>
+            <a:endParaRPr lang="en-GB"/>
+          </a:p>
+        </p:txBody>
+      </p:sp>
+    </p:spTree>
+    <p:extLst>
+      <p:ext uri="{BB962C8B-B14F-4D97-AF65-F5344CB8AC3E}">
+        <p14:creationId xmlns:p14="http://schemas.microsoft.com/office/powerpoint/2010/main" val="712734329"/>
       </p:ext>
     </p:extLst>
   </p:cSld>

</xml_diff>